<commit_message>
PAI 03 und 03 Blocksatz
</commit_message>
<xml_diff>
--- a/training-cards/music moves/Pairing (PAI)/ger/apprentice/ger_PAI_02_Zusammen_den_Nebel_lichten_MM_A.pptx
+++ b/training-cards/music moves/Pairing (PAI)/ger/apprentice/ger_PAI_02_Zusammen_den_Nebel_lichten_MM_A.pptx
@@ -535,7 +535,7 @@
           </a:ln>
           <a:extLst>
             <a:ext uri="{C572A759-6A51-4108-AA02-DFA0A04FC94B}">
-              <ma14:wrappingTextBoxFlag xmlns="" xmlns:ma14="http://schemas.microsoft.com/office/mac/drawingml/2011/main" val="1"/>
+              <ma14:wrappingTextBoxFlag xmlns:ma14="http://schemas.microsoft.com/office/mac/drawingml/2011/main" xmlns="" val="1"/>
             </a:ext>
           </a:extLst>
         </p:spPr>
@@ -887,7 +887,7 @@
           <a:p>
             <a:fld id="{FF5B2BAF-DF38-0A48-A798-0C06E514FD52}" type="datetimeFigureOut">
               <a:rPr lang="de-DE" smtClean="0"/>
-              <a:t>27.07.23</a:t>
+              <a:t>28.10.25</a:t>
             </a:fld>
             <a:endParaRPr lang="de-DE" dirty="0"/>
           </a:p>
@@ -1107,7 +1107,7 @@
           <a:p>
             <a:fld id="{FF5B2BAF-DF38-0A48-A798-0C06E514FD52}" type="datetimeFigureOut">
               <a:rPr lang="de-DE" smtClean="0"/>
-              <a:t>27.07.23</a:t>
+              <a:t>28.10.25</a:t>
             </a:fld>
             <a:endParaRPr lang="de-DE" dirty="0"/>
           </a:p>
@@ -1782,18 +1782,21 @@
           </a:bodyPr>
           <a:lstStyle/>
           <a:p>
+            <a:pPr algn="just"/>
             <a:r>
               <a:rPr lang="de-DE" sz="1200" dirty="0"/>
               <a:t>Pairing kann Dir helfen Klarheit und Struktur beim Üben zu trainieren.</a:t>
             </a:r>
           </a:p>
           <a:p>
+            <a:pPr algn="just"/>
             <a:r>
               <a:rPr lang="de-DE" sz="1200" dirty="0"/>
               <a:t>Wie Du vielleicht bemerkt hast, wenn Du PAI 01 bereits trainiert hast, bemühst Du Dich als Pilot wahrscheinlich viel mehr um klares und strukturierteres Üben, wenn ein Navigator Dein Üben begleitet.</a:t>
             </a:r>
           </a:p>
           <a:p>
+            <a:pPr algn="just"/>
             <a:r>
               <a:rPr lang="de-DE" sz="1200" dirty="0"/>
               <a:t>Beim gemeinsamen Pairing-Training fragt ihr euch, welcher nächste </a:t>
@@ -1816,6 +1819,7 @@
             </a:r>
           </a:p>
           <a:p>
+            <a:pPr algn="just"/>
             <a:r>
               <a:rPr lang="de-DE" sz="1200" dirty="0"/>
               <a:t>Nehmt euch gemeinsam Zeit für eine </a:t>
@@ -1838,6 +1842,7 @@
             </a:r>
           </a:p>
           <a:p>
+            <a:pPr algn="just"/>
             <a:r>
               <a:rPr lang="de-DE" sz="1200" dirty="0"/>
               <a:t>Aufgabe des Piloten ist es beim Üben immer kurz zu sagen, welchen Schritt er als nächsten macht und warum. Der Navigator schreibt schweigend auf, was der Pilot sagt, genauso wie er seine zusätzlichen Beobachtungen notiert. Für ihn ist es wichtig wertfrei zu bleiben und vielmehr eigene Wahrnehmungen als die eigene Meinung aufzuschreiben.</a:t>
@@ -1915,12 +1920,14 @@
           <a:bodyPr/>
           <a:lstStyle/>
           <a:p>
+            <a:pPr algn="just"/>
             <a:r>
               <a:rPr lang="de-DE" dirty="0"/>
               <a:t>Trefft euch in 2 Wochen 4 mal, um zu zweit zu üben.</a:t>
             </a:r>
           </a:p>
           <a:p>
+            <a:pPr algn="just"/>
             <a:r>
               <a:rPr lang="de-DE" dirty="0"/>
               <a:t>Setzt eine Zeitspanne von mindestens 25 Minuten oder länger pro </a:t>
@@ -1935,6 +1942,7 @@
             </a:r>
           </a:p>
           <a:p>
+            <a:pPr algn="just"/>
             <a:r>
               <a:rPr lang="de-DE" dirty="0"/>
               <a:t>Der Pilot formuliert vor dem Üben sein </a:t>
@@ -1949,32 +1957,28 @@
             </a:r>
           </a:p>
           <a:p>
+            <a:pPr algn="just"/>
             <a:r>
               <a:rPr lang="de-DE" dirty="0"/>
-              <a:t>Während dem Üben </a:t>
-            </a:r>
-            <a:r>
-              <a:rPr lang="de-DE"/>
-              <a:t>spricht der Pilot aus</a:t>
-            </a:r>
-            <a:r>
-              <a:rPr lang="de-DE" dirty="0"/>
-              <a:t>, was er als nächsten Schritt macht und warum. </a:t>
-            </a:r>
-          </a:p>
-          <a:p>
+              <a:t>Während dem Üben spricht der Pilot aus, was er als nächsten Schritt macht und warum. </a:t>
+            </a:r>
+          </a:p>
+          <a:p>
+            <a:pPr algn="just"/>
             <a:r>
               <a:rPr lang="de-DE" dirty="0"/>
               <a:t>Der Navigator schreibt mit, was der Pilot sagt und was er beobachtet. </a:t>
             </a:r>
           </a:p>
           <a:p>
+            <a:pPr algn="just"/>
             <a:r>
               <a:rPr lang="de-DE" dirty="0"/>
               <a:t>Tauscht euch nach dem Üben über die gewählten Überschritte aus.</a:t>
             </a:r>
           </a:p>
           <a:p>
+            <a:pPr algn="just"/>
             <a:r>
               <a:rPr lang="de-DE" dirty="0"/>
               <a:t>Wechselt die Rollen, sodass innerhalb der 2 Wochen im gleichen Pärchen jeder zweimal Pilot und Navigator war.</a:t>

</xml_diff>